<commit_message>
Update to SB 2.2.0 and open jdk 13
</commit_message>
<xml_diff>
--- a/U_DEV_Journées_Java_Formation-v2.pptx
+++ b/U_DEV_Journées_Java_Formation-v2.pptx
@@ -5,10 +5,10 @@
     <p:sldMasterId id="2147483648" r:id="rId5"/>
   </p:sldMasterIdLst>
   <p:notesMasterIdLst>
-    <p:notesMasterId r:id="rId31"/>
+    <p:notesMasterId r:id="rId33"/>
   </p:notesMasterIdLst>
   <p:handoutMasterIdLst>
-    <p:handoutMasterId r:id="rId32"/>
+    <p:handoutMasterId r:id="rId34"/>
   </p:handoutMasterIdLst>
   <p:sldIdLst>
     <p:sldId id="257" r:id="rId6"/>
@@ -35,7 +35,9 @@
     <p:sldId id="270" r:id="rId27"/>
     <p:sldId id="299" r:id="rId28"/>
     <p:sldId id="298" r:id="rId29"/>
-    <p:sldId id="294" r:id="rId30"/>
+    <p:sldId id="300" r:id="rId30"/>
+    <p:sldId id="301" r:id="rId31"/>
+    <p:sldId id="294" r:id="rId32"/>
   </p:sldIdLst>
   <p:sldSz cx="12192000" cy="6858000"/>
   <p:notesSz cx="6858000" cy="9144000"/>
@@ -24520,11 +24522,13 @@
         </p:nvSpPr>
         <p:spPr/>
         <p:txBody>
-          <a:bodyPr/>
+          <a:bodyPr>
+            <a:normAutofit/>
+          </a:bodyPr>
           <a:lstStyle/>
           <a:p>
             <a:r>
-              <a:rPr lang="en-US" dirty="0"/>
+              <a:rPr lang="en-US" sz="4000" dirty="0"/>
               <a:t>Java days</a:t>
             </a:r>
           </a:p>
@@ -24549,23 +24553,54 @@
         <p:spPr>
           <a:xfrm>
             <a:off x="5448300" y="3401485"/>
-            <a:ext cx="6193970" cy="1035627"/>
+            <a:ext cx="6193970" cy="1467675"/>
           </a:xfrm>
         </p:spPr>
         <p:txBody>
-          <a:bodyPr/>
+          <a:bodyPr>
+            <a:noAutofit/>
+          </a:bodyPr>
           <a:lstStyle/>
           <a:p>
             <a:r>
-              <a:rPr lang="en-US" dirty="0"/>
+              <a:rPr lang="en-US" sz="1800" dirty="0" smtClean="0"/>
               <a:t>Spring</a:t>
             </a:r>
           </a:p>
           <a:p>
-            <a:r>
-              <a:rPr lang="en-US" dirty="0"/>
-              <a:t>Spring Boot</a:t>
-            </a:r>
+            <a:endParaRPr lang="en-US" sz="1800" dirty="0"/>
+          </a:p>
+          <a:p>
+            <a:r>
+              <a:rPr lang="en-US" sz="1800" dirty="0"/>
+              <a:t>Spring </a:t>
+            </a:r>
+            <a:r>
+              <a:rPr lang="en-US" sz="1800" dirty="0" smtClean="0"/>
+              <a:t>Boot</a:t>
+            </a:r>
+          </a:p>
+          <a:p>
+            <a:endParaRPr lang="en-US" sz="1800" dirty="0" smtClean="0"/>
+          </a:p>
+          <a:p>
+            <a:r>
+              <a:rPr lang="en-US" sz="1800" dirty="0" smtClean="0"/>
+              <a:t>REST </a:t>
+            </a:r>
+            <a:r>
+              <a:rPr lang="en-US" sz="1800" dirty="0" err="1"/>
+              <a:t>A</a:t>
+            </a:r>
+            <a:r>
+              <a:rPr lang="en-US" sz="1800" dirty="0" err="1" smtClean="0"/>
+              <a:t>pi</a:t>
+            </a:r>
+            <a:r>
+              <a:rPr lang="en-US" sz="1800" dirty="0" smtClean="0"/>
+              <a:t> introduction</a:t>
+            </a:r>
+            <a:endParaRPr lang="en-US" sz="1800" dirty="0"/>
           </a:p>
         </p:txBody>
       </p:sp>
@@ -24612,6 +24647,13 @@
   <p:transition>
     <p:fade/>
   </p:transition>
+  <p:timing>
+    <p:tnLst>
+      <p:par>
+        <p:cTn id="1" dur="indefinite" restart="never" nodeType="tmRoot"/>
+      </p:par>
+    </p:tnLst>
+  </p:timing>
 </p:sld>
 </file>
 
@@ -24654,6 +24696,13 @@
           <a:prstGeom prst="rect">
             <a:avLst/>
           </a:prstGeom>
+          <a:effectLst>
+            <a:outerShdw blurRad="50800" dist="38100" dir="2700000" algn="tl" rotWithShape="0">
+              <a:prstClr val="black">
+                <a:alpha val="40000"/>
+              </a:prstClr>
+            </a:outerShdw>
+          </a:effectLst>
         </p:spPr>
       </p:pic>
       <p:sp>
@@ -25293,6 +25342,13 @@
           <a:prstGeom prst="rect">
             <a:avLst/>
           </a:prstGeom>
+          <a:effectLst>
+            <a:outerShdw blurRad="50800" dist="38100" dir="2700000" algn="tl" rotWithShape="0">
+              <a:prstClr val="black">
+                <a:alpha val="40000"/>
+              </a:prstClr>
+            </a:outerShdw>
+          </a:effectLst>
         </p:spPr>
       </p:pic>
     </p:spTree>
@@ -25513,6 +25569,13 @@
           <a:prstGeom prst="rect">
             <a:avLst/>
           </a:prstGeom>
+          <a:effectLst>
+            <a:outerShdw blurRad="50800" dist="38100" dir="2700000" algn="tl" rotWithShape="0">
+              <a:prstClr val="black">
+                <a:alpha val="40000"/>
+              </a:prstClr>
+            </a:outerShdw>
+          </a:effectLst>
         </p:spPr>
       </p:pic>
       <p:sp>
@@ -25663,6 +25726,13 @@
           <a:prstGeom prst="rect">
             <a:avLst/>
           </a:prstGeom>
+          <a:effectLst>
+            <a:outerShdw blurRad="50800" dist="38100" dir="2700000" algn="tl" rotWithShape="0">
+              <a:prstClr val="black">
+                <a:alpha val="40000"/>
+              </a:prstClr>
+            </a:outerShdw>
+          </a:effectLst>
         </p:spPr>
       </p:pic>
       <p:pic>
@@ -25693,6 +25763,13 @@
           <a:prstGeom prst="rect">
             <a:avLst/>
           </a:prstGeom>
+          <a:effectLst>
+            <a:outerShdw blurRad="50800" dist="38100" dir="2700000" algn="tl" rotWithShape="0">
+              <a:prstClr val="black">
+                <a:alpha val="40000"/>
+              </a:prstClr>
+            </a:outerShdw>
+          </a:effectLst>
         </p:spPr>
       </p:pic>
       <p:sp>
@@ -26851,6 +26928,13 @@
           <a:prstGeom prst="rect">
             <a:avLst/>
           </a:prstGeom>
+          <a:effectLst>
+            <a:outerShdw blurRad="50800" dist="38100" dir="2700000" algn="tl" rotWithShape="0">
+              <a:prstClr val="black">
+                <a:alpha val="40000"/>
+              </a:prstClr>
+            </a:outerShdw>
+          </a:effectLst>
         </p:spPr>
       </p:pic>
     </p:spTree>
@@ -27199,6 +27283,13 @@
           <a:prstGeom prst="rect">
             <a:avLst/>
           </a:prstGeom>
+          <a:effectLst>
+            <a:outerShdw blurRad="50800" dist="38100" dir="2700000" algn="tl" rotWithShape="0">
+              <a:prstClr val="black">
+                <a:alpha val="40000"/>
+              </a:prstClr>
+            </a:outerShdw>
+          </a:effectLst>
         </p:spPr>
       </p:pic>
     </p:spTree>
@@ -27713,6 +27804,13 @@
           <a:prstGeom prst="rect">
             <a:avLst/>
           </a:prstGeom>
+          <a:effectLst>
+            <a:outerShdw blurRad="50800" dist="38100" dir="2700000" algn="tl" rotWithShape="0">
+              <a:prstClr val="black">
+                <a:alpha val="40000"/>
+              </a:prstClr>
+            </a:outerShdw>
+          </a:effectLst>
         </p:spPr>
       </p:pic>
       <p:pic>
@@ -27745,6 +27843,13 @@
           <a:prstGeom prst="rect">
             <a:avLst/>
           </a:prstGeom>
+          <a:effectLst>
+            <a:outerShdw blurRad="50800" dist="38100" dir="2700000" algn="tl" rotWithShape="0">
+              <a:prstClr val="black">
+                <a:alpha val="40000"/>
+              </a:prstClr>
+            </a:outerShdw>
+          </a:effectLst>
         </p:spPr>
       </p:pic>
       <p:pic>
@@ -27775,6 +27880,13 @@
           <a:prstGeom prst="rect">
             <a:avLst/>
           </a:prstGeom>
+          <a:effectLst>
+            <a:outerShdw blurRad="50800" dist="38100" dir="2700000" algn="tl" rotWithShape="0">
+              <a:prstClr val="black">
+                <a:alpha val="40000"/>
+              </a:prstClr>
+            </a:outerShdw>
+          </a:effectLst>
         </p:spPr>
       </p:pic>
       <p:pic>
@@ -27805,6 +27917,13 @@
           <a:prstGeom prst="rect">
             <a:avLst/>
           </a:prstGeom>
+          <a:effectLst>
+            <a:outerShdw blurRad="50800" dist="38100" dir="2700000" algn="tl" rotWithShape="0">
+              <a:prstClr val="black">
+                <a:alpha val="40000"/>
+              </a:prstClr>
+            </a:outerShdw>
+          </a:effectLst>
         </p:spPr>
       </p:pic>
       <p:sp>
@@ -28451,6 +28570,13 @@
   <p:clrMapOvr>
     <a:masterClrMapping/>
   </p:clrMapOvr>
+  <p:timing>
+    <p:tnLst>
+      <p:par>
+        <p:cTn id="1" dur="indefinite" restart="never" nodeType="tmRoot"/>
+      </p:par>
+    </p:tnLst>
+  </p:timing>
 </p:sld>
 </file>
 
@@ -28716,6 +28842,13 @@
   <p:clrMapOvr>
     <a:masterClrMapping/>
   </p:clrMapOvr>
+  <p:timing>
+    <p:tnLst>
+      <p:par>
+        <p:cTn id="1" dur="indefinite" restart="never" nodeType="tmRoot"/>
+      </p:par>
+    </p:tnLst>
+  </p:timing>
 </p:sld>
 </file>
 
@@ -28933,6 +29066,13 @@
           <a:prstGeom prst="rect">
             <a:avLst/>
           </a:prstGeom>
+          <a:effectLst>
+            <a:outerShdw blurRad="50800" dist="38100" dir="2700000" algn="tl" rotWithShape="0">
+              <a:prstClr val="black">
+                <a:alpha val="40000"/>
+              </a:prstClr>
+            </a:outerShdw>
+          </a:effectLst>
         </p:spPr>
       </p:pic>
     </p:spTree>
@@ -28945,6 +29085,13 @@
   <p:clrMapOvr>
     <a:masterClrMapping/>
   </p:clrMapOvr>
+  <p:timing>
+    <p:tnLst>
+      <p:par>
+        <p:cTn id="1" dur="indefinite" restart="never" nodeType="tmRoot"/>
+      </p:par>
+    </p:tnLst>
+  </p:timing>
 </p:sld>
 </file>
 
@@ -29386,6 +29533,13 @@
           <a:prstGeom prst="rect">
             <a:avLst/>
           </a:prstGeom>
+          <a:effectLst>
+            <a:outerShdw blurRad="50800" dist="38100" dir="2700000" algn="tl" rotWithShape="0">
+              <a:prstClr val="black">
+                <a:alpha val="40000"/>
+              </a:prstClr>
+            </a:outerShdw>
+          </a:effectLst>
         </p:spPr>
       </p:pic>
     </p:spTree>
@@ -29398,6 +29552,13 @@
   <p:clrMapOvr>
     <a:masterClrMapping/>
   </p:clrMapOvr>
+  <p:timing>
+    <p:tnLst>
+      <p:par>
+        <p:cTn id="1" dur="indefinite" restart="never" nodeType="tmRoot"/>
+      </p:par>
+    </p:tnLst>
+  </p:timing>
 </p:sld>
 </file>
 
@@ -29871,6 +30032,13 @@
             <a:avLst/>
           </a:prstGeom>
           <a:noFill/>
+          <a:effectLst>
+            <a:outerShdw blurRad="50800" dist="38100" dir="2700000" algn="tl" rotWithShape="0">
+              <a:prstClr val="black">
+                <a:alpha val="40000"/>
+              </a:prstClr>
+            </a:outerShdw>
+          </a:effectLst>
           <a:extLst>
             <a:ext uri="{909E8E84-426E-40DD-AFC4-6F175D3DCCD1}">
               <a14:hiddenFill xmlns:a14="http://schemas.microsoft.com/office/drawing/2010/main">
@@ -29892,10 +30060,310 @@
   <p:clrMapOvr>
     <a:masterClrMapping/>
   </p:clrMapOvr>
+  <p:timing>
+    <p:tnLst>
+      <p:par>
+        <p:cTn id="1" dur="indefinite" restart="never" nodeType="tmRoot"/>
+      </p:par>
+    </p:tnLst>
+  </p:timing>
 </p:sld>
 </file>
 
 <file path=ppt/slides/slide25.xml><?xml version="1.0" encoding="utf-8"?>
+<p:sld xmlns:a="http://schemas.openxmlformats.org/drawingml/2006/main" xmlns:r="http://schemas.openxmlformats.org/officeDocument/2006/relationships" xmlns:p="http://schemas.openxmlformats.org/presentationml/2006/main">
+  <p:cSld>
+    <p:spTree>
+      <p:nvGrpSpPr>
+        <p:cNvPr id="1" name=""/>
+        <p:cNvGrpSpPr/>
+        <p:nvPr/>
+      </p:nvGrpSpPr>
+      <p:grpSpPr>
+        <a:xfrm>
+          <a:off x="0" y="0"/>
+          <a:ext cx="0" cy="0"/>
+          <a:chOff x="0" y="0"/>
+          <a:chExt cx="0" cy="0"/>
+        </a:xfrm>
+      </p:grpSpPr>
+      <p:sp>
+        <p:nvSpPr>
+          <p:cNvPr id="2" name="Titre 1"/>
+          <p:cNvSpPr>
+            <a:spLocks noGrp="1"/>
+          </p:cNvSpPr>
+          <p:nvPr>
+            <p:ph type="title"/>
+          </p:nvPr>
+        </p:nvSpPr>
+        <p:spPr/>
+        <p:txBody>
+          <a:bodyPr/>
+          <a:lstStyle/>
+          <a:p>
+            <a:r>
+              <a:rPr lang="fr-FR" dirty="0" smtClean="0"/>
+              <a:t>Un mot sur Docker</a:t>
+            </a:r>
+            <a:endParaRPr lang="fr-FR" dirty="0"/>
+          </a:p>
+        </p:txBody>
+      </p:sp>
+      <p:sp>
+        <p:nvSpPr>
+          <p:cNvPr id="4" name="Espace réservé du numéro de diapositive 3"/>
+          <p:cNvSpPr>
+            <a:spLocks noGrp="1"/>
+          </p:cNvSpPr>
+          <p:nvPr>
+            <p:ph type="sldNum" sz="quarter" idx="4"/>
+          </p:nvPr>
+        </p:nvSpPr>
+        <p:spPr/>
+        <p:txBody>
+          <a:bodyPr/>
+          <a:lstStyle/>
+          <a:p>
+            <a:fld id="{525A3C56-E491-49B2-93F3-63532DF516BC}" type="slidenum">
+              <a:rPr lang="en-US" smtClean="0"/>
+              <a:pPr/>
+              <a:t>25</a:t>
+            </a:fld>
+            <a:endParaRPr lang="en-US"/>
+          </a:p>
+        </p:txBody>
+      </p:sp>
+      <p:pic>
+        <p:nvPicPr>
+          <p:cNvPr id="1026" name="Picture 2" descr="Résultat de recherche d'images pour &quot;docker&quot;&quot;"/>
+          <p:cNvPicPr>
+            <a:picLocks noChangeAspect="1" noChangeArrowheads="1"/>
+          </p:cNvPicPr>
+          <p:nvPr/>
+        </p:nvPicPr>
+        <p:blipFill>
+          <a:blip r:embed="rId2">
+            <a:extLst>
+              <a:ext uri="{28A0092B-C50C-407E-A947-70E740481C1C}">
+                <a14:useLocalDpi xmlns:a14="http://schemas.microsoft.com/office/drawing/2010/main" val="0"/>
+              </a:ext>
+            </a:extLst>
+          </a:blip>
+          <a:srcRect/>
+          <a:stretch>
+            <a:fillRect/>
+          </a:stretch>
+        </p:blipFill>
+        <p:spPr bwMode="auto">
+          <a:xfrm>
+            <a:off x="2855640" y="1484784"/>
+            <a:ext cx="5904656" cy="4814566"/>
+          </a:xfrm>
+          <a:prstGeom prst="rect">
+            <a:avLst/>
+          </a:prstGeom>
+          <a:noFill/>
+          <a:extLst>
+            <a:ext uri="{909E8E84-426E-40DD-AFC4-6F175D3DCCD1}">
+              <a14:hiddenFill xmlns:a14="http://schemas.microsoft.com/office/drawing/2010/main">
+                <a:solidFill>
+                  <a:srgbClr val="FFFFFF"/>
+                </a:solidFill>
+              </a14:hiddenFill>
+            </a:ext>
+          </a:extLst>
+        </p:spPr>
+      </p:pic>
+    </p:spTree>
+    <p:extLst>
+      <p:ext uri="{BB962C8B-B14F-4D97-AF65-F5344CB8AC3E}">
+        <p14:creationId xmlns:p14="http://schemas.microsoft.com/office/powerpoint/2010/main" val="3315254860"/>
+      </p:ext>
+    </p:extLst>
+  </p:cSld>
+  <p:clrMapOvr>
+    <a:masterClrMapping/>
+  </p:clrMapOvr>
+  <p:timing>
+    <p:tnLst>
+      <p:par>
+        <p:cTn id="1" dur="indefinite" restart="never" nodeType="tmRoot"/>
+      </p:par>
+    </p:tnLst>
+  </p:timing>
+</p:sld>
+</file>
+
+<file path=ppt/slides/slide26.xml><?xml version="1.0" encoding="utf-8"?>
+<p:sld xmlns:a="http://schemas.openxmlformats.org/drawingml/2006/main" xmlns:r="http://schemas.openxmlformats.org/officeDocument/2006/relationships" xmlns:p="http://schemas.openxmlformats.org/presentationml/2006/main">
+  <p:cSld>
+    <p:spTree>
+      <p:nvGrpSpPr>
+        <p:cNvPr id="1" name=""/>
+        <p:cNvGrpSpPr/>
+        <p:nvPr/>
+      </p:nvGrpSpPr>
+      <p:grpSpPr>
+        <a:xfrm>
+          <a:off x="0" y="0"/>
+          <a:ext cx="0" cy="0"/>
+          <a:chOff x="0" y="0"/>
+          <a:chExt cx="0" cy="0"/>
+        </a:xfrm>
+      </p:grpSpPr>
+      <p:sp>
+        <p:nvSpPr>
+          <p:cNvPr id="2" name="Titre 1"/>
+          <p:cNvSpPr>
+            <a:spLocks noGrp="1"/>
+          </p:cNvSpPr>
+          <p:nvPr>
+            <p:ph type="title"/>
+          </p:nvPr>
+        </p:nvSpPr>
+        <p:spPr/>
+        <p:txBody>
+          <a:bodyPr/>
+          <a:lstStyle/>
+          <a:p>
+            <a:r>
+              <a:rPr lang="fr-FR" dirty="0" smtClean="0"/>
+              <a:t>Un mot sur Docker - </a:t>
+            </a:r>
+            <a:r>
+              <a:rPr lang="fr-FR" dirty="0" err="1" smtClean="0"/>
+              <a:t>Dockerfile</a:t>
+            </a:r>
+            <a:endParaRPr lang="fr-FR" dirty="0"/>
+          </a:p>
+        </p:txBody>
+      </p:sp>
+      <p:sp>
+        <p:nvSpPr>
+          <p:cNvPr id="4" name="Espace réservé du numéro de diapositive 3"/>
+          <p:cNvSpPr>
+            <a:spLocks noGrp="1"/>
+          </p:cNvSpPr>
+          <p:nvPr>
+            <p:ph type="sldNum" sz="quarter" idx="4"/>
+          </p:nvPr>
+        </p:nvSpPr>
+        <p:spPr/>
+        <p:txBody>
+          <a:bodyPr/>
+          <a:lstStyle/>
+          <a:p>
+            <a:fld id="{525A3C56-E491-49B2-93F3-63532DF516BC}" type="slidenum">
+              <a:rPr lang="en-US" smtClean="0"/>
+              <a:pPr/>
+              <a:t>26</a:t>
+            </a:fld>
+            <a:endParaRPr lang="en-US"/>
+          </a:p>
+        </p:txBody>
+      </p:sp>
+      <p:pic>
+        <p:nvPicPr>
+          <p:cNvPr id="12" name="Image 11"/>
+          <p:cNvPicPr>
+            <a:picLocks noChangeAspect="1"/>
+          </p:cNvPicPr>
+          <p:nvPr/>
+        </p:nvPicPr>
+        <p:blipFill>
+          <a:blip r:embed="rId2"/>
+          <a:stretch>
+            <a:fillRect/>
+          </a:stretch>
+        </p:blipFill>
+        <p:spPr>
+          <a:xfrm>
+            <a:off x="839416" y="2996952"/>
+            <a:ext cx="6843986" cy="1286247"/>
+          </a:xfrm>
+          <a:prstGeom prst="rect">
+            <a:avLst/>
+          </a:prstGeom>
+          <a:effectLst>
+            <a:outerShdw blurRad="50800" dist="38100" dir="2700000" algn="tl" rotWithShape="0">
+              <a:prstClr val="black">
+                <a:alpha val="40000"/>
+              </a:prstClr>
+            </a:outerShdw>
+            <a:softEdge rad="25400"/>
+          </a:effectLst>
+        </p:spPr>
+      </p:pic>
+      <p:pic>
+        <p:nvPicPr>
+          <p:cNvPr id="2055" name="Picture 7" descr="Résultat de recherche d'images pour &quot;recipe book&quot;&quot;"/>
+          <p:cNvPicPr>
+            <a:picLocks noChangeAspect="1" noChangeArrowheads="1"/>
+          </p:cNvPicPr>
+          <p:nvPr/>
+        </p:nvPicPr>
+        <p:blipFill>
+          <a:blip r:embed="rId3">
+            <a:extLst>
+              <a:ext uri="{28A0092B-C50C-407E-A947-70E740481C1C}">
+                <a14:useLocalDpi xmlns:a14="http://schemas.microsoft.com/office/drawing/2010/main" val="0"/>
+              </a:ext>
+            </a:extLst>
+          </a:blip>
+          <a:srcRect/>
+          <a:stretch>
+            <a:fillRect/>
+          </a:stretch>
+        </p:blipFill>
+        <p:spPr bwMode="auto">
+          <a:xfrm>
+            <a:off x="8472264" y="2694347"/>
+            <a:ext cx="2521941" cy="1891456"/>
+          </a:xfrm>
+          <a:prstGeom prst="rect">
+            <a:avLst/>
+          </a:prstGeom>
+          <a:noFill/>
+          <a:effectLst>
+            <a:outerShdw blurRad="50800" dist="38100" dir="2700000" algn="tl" rotWithShape="0">
+              <a:prstClr val="black">
+                <a:alpha val="40000"/>
+              </a:prstClr>
+            </a:outerShdw>
+          </a:effectLst>
+          <a:extLst>
+            <a:ext uri="{909E8E84-426E-40DD-AFC4-6F175D3DCCD1}">
+              <a14:hiddenFill xmlns:a14="http://schemas.microsoft.com/office/drawing/2010/main">
+                <a:solidFill>
+                  <a:srgbClr val="FFFFFF"/>
+                </a:solidFill>
+              </a14:hiddenFill>
+            </a:ext>
+          </a:extLst>
+        </p:spPr>
+      </p:pic>
+    </p:spTree>
+    <p:extLst>
+      <p:ext uri="{BB962C8B-B14F-4D97-AF65-F5344CB8AC3E}">
+        <p14:creationId xmlns:p14="http://schemas.microsoft.com/office/powerpoint/2010/main" val="1360053390"/>
+      </p:ext>
+    </p:extLst>
+  </p:cSld>
+  <p:clrMapOvr>
+    <a:masterClrMapping/>
+  </p:clrMapOvr>
+  <p:timing>
+    <p:tnLst>
+      <p:par>
+        <p:cTn id="1" dur="indefinite" restart="never" nodeType="tmRoot"/>
+      </p:par>
+    </p:tnLst>
+  </p:timing>
+</p:sld>
+</file>
+
+<file path=ppt/slides/slide27.xml><?xml version="1.0" encoding="utf-8"?>
 <p:sld xmlns:a="http://schemas.openxmlformats.org/drawingml/2006/main" xmlns:r="http://schemas.openxmlformats.org/officeDocument/2006/relationships" xmlns:p="http://schemas.openxmlformats.org/presentationml/2006/main">
   <p:cSld>
     <p:spTree>
@@ -29936,7 +30404,7 @@
             <a:fld id="{525A3C56-E491-49B2-93F3-63532DF516BC}" type="slidenum">
               <a:rPr lang="en-US" smtClean="0"/>
               <a:pPr/>
-              <a:t>25</a:t>
+              <a:t>27</a:t>
             </a:fld>
             <a:endParaRPr lang="en-US"/>
           </a:p>
@@ -29970,6 +30438,13 @@
           <a:prstGeom prst="rect">
             <a:avLst/>
           </a:prstGeom>
+          <a:effectLst>
+            <a:outerShdw blurRad="50800" dist="38100" dir="2700000" algn="tl" rotWithShape="0">
+              <a:prstClr val="black">
+                <a:alpha val="40000"/>
+              </a:prstClr>
+            </a:outerShdw>
+          </a:effectLst>
         </p:spPr>
       </p:pic>
     </p:spTree>
@@ -29982,6 +30457,13 @@
   <p:clrMapOvr>
     <a:masterClrMapping/>
   </p:clrMapOvr>
+  <p:timing>
+    <p:tnLst>
+      <p:par>
+        <p:cTn id="1" dur="indefinite" restart="never" nodeType="tmRoot"/>
+      </p:par>
+    </p:tnLst>
+  </p:timing>
 </p:sld>
 </file>
 
@@ -30298,6 +30780,13 @@
           <a:prstGeom prst="rect">
             <a:avLst/>
           </a:prstGeom>
+          <a:effectLst>
+            <a:outerShdw blurRad="50800" dist="38100" dir="2700000" algn="tl" rotWithShape="0">
+              <a:prstClr val="black">
+                <a:alpha val="40000"/>
+              </a:prstClr>
+            </a:outerShdw>
+          </a:effectLst>
         </p:spPr>
       </p:pic>
       <p:sp>
@@ -31511,6 +32000,13 @@
           <a:prstGeom prst="rect">
             <a:avLst/>
           </a:prstGeom>
+          <a:effectLst>
+            <a:outerShdw blurRad="50800" dist="38100" dir="2700000" algn="tl" rotWithShape="0">
+              <a:prstClr val="black">
+                <a:alpha val="40000"/>
+              </a:prstClr>
+            </a:outerShdw>
+          </a:effectLst>
         </p:spPr>
       </p:pic>
       <p:sp>
@@ -32927,6 +33423,15 @@
 </file>
 
 <file path=customXml/item1.xml><?xml version="1.0" encoding="utf-8"?>
+<?mso-contentType ?>
+<FormTemplates xmlns="http://schemas.microsoft.com/sharepoint/v3/contenttype/forms">
+  <Display>DocumentLibraryForm</Display>
+  <Edit>DocumentLibraryForm</Edit>
+  <New>DocumentLibraryForm</New>
+</FormTemplates>
+</file>
+
+<file path=customXml/item2.xml><?xml version="1.0" encoding="utf-8"?>
 <p:properties xmlns:p="http://schemas.microsoft.com/office/2006/metadata/properties" xmlns:xsi="http://www.w3.org/2001/XMLSchema-instance">
   <documentManagement>
     <c5aebc35b3e840e5912c276ffe755dcf xmlns="d95a5b16-1b8d-4c7c-9ebf-89c0983b6970">
@@ -33007,152 +33512,7 @@
 </p:properties>
 </file>
 
-<file path=customXml/item2.xml><?xml version="1.0" encoding="utf-8"?>
-<?mso-contentType ?>
-<FormTemplates xmlns="http://schemas.microsoft.com/sharepoint/v3/contenttype/forms">
-  <Display>DocumentLibraryForm</Display>
-  <Edit>DocumentLibraryForm</Edit>
-  <New>DocumentLibraryForm</New>
-</FormTemplates>
-</file>
-
 <file path=customXml/item3.xml><?xml version="1.0" encoding="utf-8"?>
-<?mso-contentType ?>
-<spe:Receivers xmlns:spe="http://schemas.microsoft.com/sharepoint/events">
-  <Receiver>
-    <Name>ItemUpdatedEventHandlerForConceptSearch</Name>
-    <Synchronization>Default</Synchronization>
-    <Type>10002</Type>
-    <SequenceNumber>10001</SequenceNumber>
-    <Assembly>conceptSearching.Sharepoint.ContentTypes, Version=1.0.0.0, Culture=neutral, PublicKeyToken=858f8f13980e4745</Assembly>
-    <Class>conceptSearching.Sharepoint.ContentTypes.CSHandleEvent</Class>
-    <Data/>
-    <Filter/>
-  </Receiver>
-  <Receiver>
-    <Name>ItemCheckedInEventHandlerForConceptSearch</Name>
-    <Synchronization>Default</Synchronization>
-    <Type>10004</Type>
-    <SequenceNumber>10002</SequenceNumber>
-    <Assembly>conceptSearching.Sharepoint.ContentTypes, Version=1.0.0.0, Culture=neutral, PublicKeyToken=858f8f13980e4745</Assembly>
-    <Class>conceptSearching.Sharepoint.ContentTypes.CSHandleEvent</Class>
-    <Data/>
-    <Filter/>
-  </Receiver>
-  <Receiver>
-    <Name>ItemUncheckedOutEventHandlerForConceptSearch</Name>
-    <Synchronization>Default</Synchronization>
-    <Type>10006</Type>
-    <SequenceNumber>10003</SequenceNumber>
-    <Assembly>conceptSearching.Sharepoint.ContentTypes, Version=1.0.0.0, Culture=neutral, PublicKeyToken=858f8f13980e4745</Assembly>
-    <Class>conceptSearching.Sharepoint.ContentTypes.CSHandleEvent</Class>
-    <Data/>
-    <Filter/>
-  </Receiver>
-  <Receiver>
-    <Name>ItemAddedEventHandlerForConceptSearch</Name>
-    <Synchronization>Default</Synchronization>
-    <Type>10001</Type>
-    <SequenceNumber>10004</SequenceNumber>
-    <Assembly>conceptSearching.Sharepoint.ContentTypes, Version=1.0.0.0, Culture=neutral, PublicKeyToken=858f8f13980e4745</Assembly>
-    <Class>conceptSearching.Sharepoint.ContentTypes.CSHandleEvent</Class>
-    <Data/>
-    <Filter/>
-  </Receiver>
-  <Receiver>
-    <Name>ItemFileMovedEventHandlerForConceptSearch</Name>
-    <Synchronization>Default</Synchronization>
-    <Type>10009</Type>
-    <SequenceNumber>10005</SequenceNumber>
-    <Assembly>conceptSearching.Sharepoint.ContentTypes, Version=1.0.0.0, Culture=neutral, PublicKeyToken=858f8f13980e4745</Assembly>
-    <Class>conceptSearching.Sharepoint.ContentTypes.CSHandleEvent</Class>
-    <Data/>
-    <Filter/>
-  </Receiver>
-  <Receiver>
-    <Name>ItemDeletedEventHandlerForConceptSearch</Name>
-    <Synchronization>Default</Synchronization>
-    <Type>10003</Type>
-    <SequenceNumber>10006</SequenceNumber>
-    <Assembly>conceptSearching.Sharepoint.ContentTypes, Version=1.0.0.0, Culture=neutral, PublicKeyToken=858f8f13980e4745</Assembly>
-    <Class>conceptSearching.Sharepoint.ContentTypes.CSHandleEvent</Class>
-    <Data/>
-    <Filter/>
-  </Receiver>
-  <Receiver>
-    <Name>ItemUpdatedEventHandlerForConceptSearch</Name>
-    <Synchronization>Asynchronous</Synchronization>
-    <Type>10002</Type>
-    <SequenceNumber>10001</SequenceNumber>
-    <Assembly>conceptSearching.Sharepoint.ContentTypes2010, Version=1.0.0.0, Culture=neutral, PublicKeyToken=858f8f13980e4745</Assembly>
-    <Class>conceptSearching.Sharepoint.ContentTypes2010.CSHandleEvent</Class>
-    <Data/>
-    <Filter/>
-  </Receiver>
-  <Receiver>
-    <Name>ItemUpdatingEventHandlerForConceptSearch</Name>
-    <Synchronization>Synchronous</Synchronization>
-    <Type>2</Type>
-    <SequenceNumber>10001</SequenceNumber>
-    <Assembly>conceptSearching.Sharepoint.ContentTypes2010, Version=1.0.0.0, Culture=neutral, PublicKeyToken=858f8f13980e4745</Assembly>
-    <Class>conceptSearching.Sharepoint.ContentTypes2010.CSHandleEvent</Class>
-    <Data/>
-    <Filter/>
-  </Receiver>
-  <Receiver>
-    <Name>ItemCheckedInEventHandlerForConceptSearch</Name>
-    <Synchronization>Asynchronous</Synchronization>
-    <Type>10004</Type>
-    <SequenceNumber>10002</SequenceNumber>
-    <Assembly>conceptSearching.Sharepoint.ContentTypes2010, Version=1.0.0.0, Culture=neutral, PublicKeyToken=858f8f13980e4745</Assembly>
-    <Class>conceptSearching.Sharepoint.ContentTypes2010.CSHandleEvent</Class>
-    <Data/>
-    <Filter/>
-  </Receiver>
-  <Receiver>
-    <Name>ItemUncheckedOutEventHandlerForConceptSearch</Name>
-    <Synchronization>Asynchronous</Synchronization>
-    <Type>10006</Type>
-    <SequenceNumber>10003</SequenceNumber>
-    <Assembly>conceptSearching.Sharepoint.ContentTypes2010, Version=1.0.0.0, Culture=neutral, PublicKeyToken=858f8f13980e4745</Assembly>
-    <Class>conceptSearching.Sharepoint.ContentTypes2010.CSHandleEvent</Class>
-    <Data/>
-    <Filter/>
-  </Receiver>
-  <Receiver>
-    <Name>ItemAddedEventHandlerForConceptSearch</Name>
-    <Synchronization>Asynchronous</Synchronization>
-    <Type>10001</Type>
-    <SequenceNumber>10004</SequenceNumber>
-    <Assembly>conceptSearching.Sharepoint.ContentTypes2010, Version=1.0.0.0, Culture=neutral, PublicKeyToken=858f8f13980e4745</Assembly>
-    <Class>conceptSearching.Sharepoint.ContentTypes2010.CSHandleEvent</Class>
-    <Data/>
-    <Filter/>
-  </Receiver>
-  <Receiver>
-    <Name>ItemFileMovedEventHandlerForConceptSearch</Name>
-    <Synchronization>Asynchronous</Synchronization>
-    <Type>10009</Type>
-    <SequenceNumber>10005</SequenceNumber>
-    <Assembly>conceptSearching.Sharepoint.ContentTypes2010, Version=1.0.0.0, Culture=neutral, PublicKeyToken=858f8f13980e4745</Assembly>
-    <Class>conceptSearching.Sharepoint.ContentTypes2010.CSHandleEvent</Class>
-    <Data/>
-    <Filter/>
-  </Receiver>
-  <Receiver>
-    <Name>ItemDeletedEventHandlerForConceptSearch</Name>
-    <Synchronization>Asynchronous</Synchronization>
-    <Type>10003</Type>
-    <SequenceNumber>10006</SequenceNumber>
-    <Assembly>conceptSearching.Sharepoint.ContentTypes2010, Version=1.0.0.0, Culture=neutral, PublicKeyToken=858f8f13980e4745</Assembly>
-    <Class>conceptSearching.Sharepoint.ContentTypes2010.CSHandleEvent</Class>
-    <Data/>
-    <Filter/>
-  </Receiver>
-</spe:Receivers>
-</file>
-
-<file path=customXml/item4.xml><?xml version="1.0" encoding="utf-8"?>
 <ct:contentTypeSchema xmlns:ct="http://schemas.microsoft.com/office/2006/metadata/contentType" xmlns:ma="http://schemas.microsoft.com/office/2006/metadata/properties/metaAttributes" ct:_="" ma:_="" ma:contentTypeName="Business Support" ma:contentTypeID="0x010100DCE5D5DBCBA6844C95AAA11EB3A32719002FF8385B8572694FA7ACC1CC37F60277" ma:contentTypeVersion="85" ma:contentTypeDescription="" ma:contentTypeScope="" ma:versionID="2e185370c66e36c56dd232e65dd02ed3">
   <xsd:schema xmlns:xsd="http://www.w3.org/2001/XMLSchema" xmlns:xs="http://www.w3.org/2001/XMLSchema" xmlns:p="http://schemas.microsoft.com/office/2006/metadata/properties" xmlns:ns1="http://schemas.microsoft.com/sharepoint/v3" xmlns:ns2="d95a5b16-1b8d-4c7c-9ebf-89c0983b6970" targetNamespace="http://schemas.microsoft.com/office/2006/metadata/properties" ma:root="true" ma:fieldsID="83532d8de379e40041d3a9288ce2e015" ns1:_="" ns2:_="">
     <xsd:import namespace="http://schemas.microsoft.com/sharepoint/v3"/>
@@ -33600,7 +33960,151 @@
 </ct:contentTypeSchema>
 </file>
 
+<file path=customXml/item4.xml><?xml version="1.0" encoding="utf-8"?>
+<?mso-contentType ?>
+<spe:Receivers xmlns:spe="http://schemas.microsoft.com/sharepoint/events">
+  <Receiver>
+    <Name>ItemUpdatedEventHandlerForConceptSearch</Name>
+    <Synchronization>Default</Synchronization>
+    <Type>10002</Type>
+    <SequenceNumber>10001</SequenceNumber>
+    <Assembly>conceptSearching.Sharepoint.ContentTypes, Version=1.0.0.0, Culture=neutral, PublicKeyToken=858f8f13980e4745</Assembly>
+    <Class>conceptSearching.Sharepoint.ContentTypes.CSHandleEvent</Class>
+    <Data/>
+    <Filter/>
+  </Receiver>
+  <Receiver>
+    <Name>ItemCheckedInEventHandlerForConceptSearch</Name>
+    <Synchronization>Default</Synchronization>
+    <Type>10004</Type>
+    <SequenceNumber>10002</SequenceNumber>
+    <Assembly>conceptSearching.Sharepoint.ContentTypes, Version=1.0.0.0, Culture=neutral, PublicKeyToken=858f8f13980e4745</Assembly>
+    <Class>conceptSearching.Sharepoint.ContentTypes.CSHandleEvent</Class>
+    <Data/>
+    <Filter/>
+  </Receiver>
+  <Receiver>
+    <Name>ItemUncheckedOutEventHandlerForConceptSearch</Name>
+    <Synchronization>Default</Synchronization>
+    <Type>10006</Type>
+    <SequenceNumber>10003</SequenceNumber>
+    <Assembly>conceptSearching.Sharepoint.ContentTypes, Version=1.0.0.0, Culture=neutral, PublicKeyToken=858f8f13980e4745</Assembly>
+    <Class>conceptSearching.Sharepoint.ContentTypes.CSHandleEvent</Class>
+    <Data/>
+    <Filter/>
+  </Receiver>
+  <Receiver>
+    <Name>ItemAddedEventHandlerForConceptSearch</Name>
+    <Synchronization>Default</Synchronization>
+    <Type>10001</Type>
+    <SequenceNumber>10004</SequenceNumber>
+    <Assembly>conceptSearching.Sharepoint.ContentTypes, Version=1.0.0.0, Culture=neutral, PublicKeyToken=858f8f13980e4745</Assembly>
+    <Class>conceptSearching.Sharepoint.ContentTypes.CSHandleEvent</Class>
+    <Data/>
+    <Filter/>
+  </Receiver>
+  <Receiver>
+    <Name>ItemFileMovedEventHandlerForConceptSearch</Name>
+    <Synchronization>Default</Synchronization>
+    <Type>10009</Type>
+    <SequenceNumber>10005</SequenceNumber>
+    <Assembly>conceptSearching.Sharepoint.ContentTypes, Version=1.0.0.0, Culture=neutral, PublicKeyToken=858f8f13980e4745</Assembly>
+    <Class>conceptSearching.Sharepoint.ContentTypes.CSHandleEvent</Class>
+    <Data/>
+    <Filter/>
+  </Receiver>
+  <Receiver>
+    <Name>ItemDeletedEventHandlerForConceptSearch</Name>
+    <Synchronization>Default</Synchronization>
+    <Type>10003</Type>
+    <SequenceNumber>10006</SequenceNumber>
+    <Assembly>conceptSearching.Sharepoint.ContentTypes, Version=1.0.0.0, Culture=neutral, PublicKeyToken=858f8f13980e4745</Assembly>
+    <Class>conceptSearching.Sharepoint.ContentTypes.CSHandleEvent</Class>
+    <Data/>
+    <Filter/>
+  </Receiver>
+  <Receiver>
+    <Name>ItemUpdatedEventHandlerForConceptSearch</Name>
+    <Synchronization>Asynchronous</Synchronization>
+    <Type>10002</Type>
+    <SequenceNumber>10001</SequenceNumber>
+    <Assembly>conceptSearching.Sharepoint.ContentTypes2010, Version=1.0.0.0, Culture=neutral, PublicKeyToken=858f8f13980e4745</Assembly>
+    <Class>conceptSearching.Sharepoint.ContentTypes2010.CSHandleEvent</Class>
+    <Data/>
+    <Filter/>
+  </Receiver>
+  <Receiver>
+    <Name>ItemUpdatingEventHandlerForConceptSearch</Name>
+    <Synchronization>Synchronous</Synchronization>
+    <Type>2</Type>
+    <SequenceNumber>10001</SequenceNumber>
+    <Assembly>conceptSearching.Sharepoint.ContentTypes2010, Version=1.0.0.0, Culture=neutral, PublicKeyToken=858f8f13980e4745</Assembly>
+    <Class>conceptSearching.Sharepoint.ContentTypes2010.CSHandleEvent</Class>
+    <Data/>
+    <Filter/>
+  </Receiver>
+  <Receiver>
+    <Name>ItemCheckedInEventHandlerForConceptSearch</Name>
+    <Synchronization>Asynchronous</Synchronization>
+    <Type>10004</Type>
+    <SequenceNumber>10002</SequenceNumber>
+    <Assembly>conceptSearching.Sharepoint.ContentTypes2010, Version=1.0.0.0, Culture=neutral, PublicKeyToken=858f8f13980e4745</Assembly>
+    <Class>conceptSearching.Sharepoint.ContentTypes2010.CSHandleEvent</Class>
+    <Data/>
+    <Filter/>
+  </Receiver>
+  <Receiver>
+    <Name>ItemUncheckedOutEventHandlerForConceptSearch</Name>
+    <Synchronization>Asynchronous</Synchronization>
+    <Type>10006</Type>
+    <SequenceNumber>10003</SequenceNumber>
+    <Assembly>conceptSearching.Sharepoint.ContentTypes2010, Version=1.0.0.0, Culture=neutral, PublicKeyToken=858f8f13980e4745</Assembly>
+    <Class>conceptSearching.Sharepoint.ContentTypes2010.CSHandleEvent</Class>
+    <Data/>
+    <Filter/>
+  </Receiver>
+  <Receiver>
+    <Name>ItemAddedEventHandlerForConceptSearch</Name>
+    <Synchronization>Asynchronous</Synchronization>
+    <Type>10001</Type>
+    <SequenceNumber>10004</SequenceNumber>
+    <Assembly>conceptSearching.Sharepoint.ContentTypes2010, Version=1.0.0.0, Culture=neutral, PublicKeyToken=858f8f13980e4745</Assembly>
+    <Class>conceptSearching.Sharepoint.ContentTypes2010.CSHandleEvent</Class>
+    <Data/>
+    <Filter/>
+  </Receiver>
+  <Receiver>
+    <Name>ItemFileMovedEventHandlerForConceptSearch</Name>
+    <Synchronization>Asynchronous</Synchronization>
+    <Type>10009</Type>
+    <SequenceNumber>10005</SequenceNumber>
+    <Assembly>conceptSearching.Sharepoint.ContentTypes2010, Version=1.0.0.0, Culture=neutral, PublicKeyToken=858f8f13980e4745</Assembly>
+    <Class>conceptSearching.Sharepoint.ContentTypes2010.CSHandleEvent</Class>
+    <Data/>
+    <Filter/>
+  </Receiver>
+  <Receiver>
+    <Name>ItemDeletedEventHandlerForConceptSearch</Name>
+    <Synchronization>Asynchronous</Synchronization>
+    <Type>10003</Type>
+    <SequenceNumber>10006</SequenceNumber>
+    <Assembly>conceptSearching.Sharepoint.ContentTypes2010, Version=1.0.0.0, Culture=neutral, PublicKeyToken=858f8f13980e4745</Assembly>
+    <Class>conceptSearching.Sharepoint.ContentTypes2010.CSHandleEvent</Class>
+    <Data/>
+    <Filter/>
+  </Receiver>
+</spe:Receivers>
+</file>
+
 <file path=customXml/itemProps1.xml><?xml version="1.0" encoding="utf-8"?>
+<ds:datastoreItem xmlns:ds="http://schemas.openxmlformats.org/officeDocument/2006/customXml" ds:itemID="{ADA5D674-9920-4D2F-B065-BC24FD29F86D}">
+  <ds:schemaRefs>
+    <ds:schemaRef ds:uri="http://schemas.microsoft.com/sharepoint/v3/contenttype/forms"/>
+  </ds:schemaRefs>
+</ds:datastoreItem>
+</file>
+
+<file path=customXml/itemProps2.xml><?xml version="1.0" encoding="utf-8"?>
 <ds:datastoreItem xmlns:ds="http://schemas.openxmlformats.org/officeDocument/2006/customXml" ds:itemID="{2F4C4F6A-F6A5-45C8-BAAA-52FB70E387C7}">
   <ds:schemaRefs>
     <ds:schemaRef ds:uri="http://purl.org/dc/elements/1.1/"/>
@@ -33617,23 +34121,7 @@
 </ds:datastoreItem>
 </file>
 
-<file path=customXml/itemProps2.xml><?xml version="1.0" encoding="utf-8"?>
-<ds:datastoreItem xmlns:ds="http://schemas.openxmlformats.org/officeDocument/2006/customXml" ds:itemID="{ADA5D674-9920-4D2F-B065-BC24FD29F86D}">
-  <ds:schemaRefs>
-    <ds:schemaRef ds:uri="http://schemas.microsoft.com/sharepoint/v3/contenttype/forms"/>
-  </ds:schemaRefs>
-</ds:datastoreItem>
-</file>
-
 <file path=customXml/itemProps3.xml><?xml version="1.0" encoding="utf-8"?>
-<ds:datastoreItem xmlns:ds="http://schemas.openxmlformats.org/officeDocument/2006/customXml" ds:itemID="{B6223829-22B6-4242-8D82-2D6B02106581}">
-  <ds:schemaRefs>
-    <ds:schemaRef ds:uri="http://schemas.microsoft.com/sharepoint/events"/>
-  </ds:schemaRefs>
-</ds:datastoreItem>
-</file>
-
-<file path=customXml/itemProps4.xml><?xml version="1.0" encoding="utf-8"?>
 <ds:datastoreItem xmlns:ds="http://schemas.openxmlformats.org/officeDocument/2006/customXml" ds:itemID="{987FA55F-5903-479D-BDD5-BC336782B1C6}">
   <ds:schemaRefs>
     <ds:schemaRef ds:uri="http://schemas.microsoft.com/office/2006/metadata/contentType"/>
@@ -33650,4 +34138,12 @@
     <ds:schemaRef ds:uri="http://schemas.microsoft.com/internal/obd"/>
   </ds:schemaRefs>
 </ds:datastoreItem>
+</file>
+
+<file path=customXml/itemProps4.xml><?xml version="1.0" encoding="utf-8"?>
+<ds:datastoreItem xmlns:ds="http://schemas.openxmlformats.org/officeDocument/2006/customXml" ds:itemID="{B6223829-22B6-4242-8D82-2D6B02106581}">
+  <ds:schemaRefs>
+    <ds:schemaRef ds:uri="http://schemas.microsoft.com/sharepoint/events"/>
+  </ds:schemaRefs>
+</ds:datastoreItem>
 </file>
</xml_diff>

<commit_message>
add auth poc with cache only
</commit_message>
<xml_diff>
--- a/U_DEV_Journées_Java_Formation-v2.pptx
+++ b/U_DEV_Journées_Java_Formation-v2.pptx
@@ -1485,6 +1485,13 @@
         </dgm:presLayoutVars>
       </dgm:prSet>
       <dgm:spPr/>
+      <dgm:t>
+        <a:bodyPr/>
+        <a:lstStyle/>
+        <a:p>
+          <a:endParaRPr lang="fr-FR"/>
+        </a:p>
+      </dgm:t>
     </dgm:pt>
     <dgm:pt modelId="{63005BE7-3469-43AD-8513-7909B56C13B4}" type="pres">
       <dgm:prSet presAssocID="{0A22175F-9E50-4726-A201-531B05BDD5B6}" presName="Name1" presStyleCnt="0"/>
@@ -1501,6 +1508,13 @@
     <dgm:pt modelId="{B710228F-41CA-41E4-A072-038F184BFE0A}" type="pres">
       <dgm:prSet presAssocID="{0A22175F-9E50-4726-A201-531B05BDD5B6}" presName="conn" presStyleLbl="parChTrans1D2" presStyleIdx="0" presStyleCnt="1"/>
       <dgm:spPr/>
+      <dgm:t>
+        <a:bodyPr/>
+        <a:lstStyle/>
+        <a:p>
+          <a:endParaRPr lang="fr-FR"/>
+        </a:p>
+      </dgm:t>
     </dgm:pt>
     <dgm:pt modelId="{44DA68F0-2BB6-4E75-9469-F307418057B0}" type="pres">
       <dgm:prSet presAssocID="{0A22175F-9E50-4726-A201-531B05BDD5B6}" presName="extraNode" presStyleLbl="node1" presStyleIdx="0" presStyleCnt="5"/>
@@ -1517,6 +1531,13 @@
         </dgm:presLayoutVars>
       </dgm:prSet>
       <dgm:spPr/>
+      <dgm:t>
+        <a:bodyPr/>
+        <a:lstStyle/>
+        <a:p>
+          <a:endParaRPr lang="fr-FR"/>
+        </a:p>
+      </dgm:t>
     </dgm:pt>
     <dgm:pt modelId="{83E6BF79-68CA-4B32-834F-CF7588D76792}" type="pres">
       <dgm:prSet presAssocID="{E720B028-D74C-4248-8004-CA63C7B0E3CB}" presName="accent_1" presStyleCnt="0"/>
@@ -1533,6 +1554,13 @@
         </dgm:presLayoutVars>
       </dgm:prSet>
       <dgm:spPr/>
+      <dgm:t>
+        <a:bodyPr/>
+        <a:lstStyle/>
+        <a:p>
+          <a:endParaRPr lang="fr-FR"/>
+        </a:p>
+      </dgm:t>
     </dgm:pt>
     <dgm:pt modelId="{7923A887-BC23-4E41-A053-6569017E0CD5}" type="pres">
       <dgm:prSet presAssocID="{6DCFE96D-80DA-46BF-A725-6CFB410E9828}" presName="accent_2" presStyleCnt="0"/>
@@ -1549,6 +1577,13 @@
         </dgm:presLayoutVars>
       </dgm:prSet>
       <dgm:spPr/>
+      <dgm:t>
+        <a:bodyPr/>
+        <a:lstStyle/>
+        <a:p>
+          <a:endParaRPr lang="fr-FR"/>
+        </a:p>
+      </dgm:t>
     </dgm:pt>
     <dgm:pt modelId="{B86D93A1-6D2F-4359-B82B-31158A6CB807}" type="pres">
       <dgm:prSet presAssocID="{5E44BE74-7BDB-4CD1-85D7-157A768B6599}" presName="accent_3" presStyleCnt="0"/>
@@ -1565,6 +1600,13 @@
         </dgm:presLayoutVars>
       </dgm:prSet>
       <dgm:spPr/>
+      <dgm:t>
+        <a:bodyPr/>
+        <a:lstStyle/>
+        <a:p>
+          <a:endParaRPr lang="fr-FR"/>
+        </a:p>
+      </dgm:t>
     </dgm:pt>
     <dgm:pt modelId="{DDDEB27D-59A0-445A-BA55-CBA8AAA7D414}" type="pres">
       <dgm:prSet presAssocID="{3D9F95B1-9E41-4B89-A74A-18D8958B5368}" presName="accent_4" presStyleCnt="0"/>
@@ -1581,6 +1623,13 @@
         </dgm:presLayoutVars>
       </dgm:prSet>
       <dgm:spPr/>
+      <dgm:t>
+        <a:bodyPr/>
+        <a:lstStyle/>
+        <a:p>
+          <a:endParaRPr lang="fr-FR"/>
+        </a:p>
+      </dgm:t>
     </dgm:pt>
     <dgm:pt modelId="{63037F71-2F9C-4941-B9BD-972E798A4752}" type="pres">
       <dgm:prSet presAssocID="{C1583B5F-B658-4636-A601-4357E8D5315D}" presName="accent_5" presStyleCnt="0"/>
@@ -1592,18 +1641,18 @@
     </dgm:pt>
   </dgm:ptLst>
   <dgm:cxnLst>
+    <dgm:cxn modelId="{11A4BB34-7391-466E-B258-C401B186171C}" type="presOf" srcId="{3D9F95B1-9E41-4B89-A74A-18D8958B5368}" destId="{23A5D521-006E-4CB2-BCA9-EC3BE9A1188B}" srcOrd="0" destOrd="0" presId="urn:microsoft.com/office/officeart/2008/layout/VerticalCurvedList"/>
+    <dgm:cxn modelId="{A259F24D-7109-408B-A0EE-7521ECE6C59F}" srcId="{0A22175F-9E50-4726-A201-531B05BDD5B6}" destId="{5E44BE74-7BDB-4CD1-85D7-157A768B6599}" srcOrd="2" destOrd="0" parTransId="{D5639A8C-0944-4765-A207-89A9F449FB58}" sibTransId="{95061DE8-40B6-492F-92B5-809BCDFD685D}"/>
+    <dgm:cxn modelId="{F9F4C943-FEA2-48AB-99D4-EE74BCB0BD8D}" type="presOf" srcId="{E720B028-D74C-4248-8004-CA63C7B0E3CB}" destId="{30D3C256-CFB7-480A-A966-7B86A386D68F}" srcOrd="0" destOrd="0" presId="urn:microsoft.com/office/officeart/2008/layout/VerticalCurvedList"/>
+    <dgm:cxn modelId="{23BCDEDB-812F-453B-8C62-1613B6288CD0}" srcId="{0A22175F-9E50-4726-A201-531B05BDD5B6}" destId="{6DCFE96D-80DA-46BF-A725-6CFB410E9828}" srcOrd="1" destOrd="0" parTransId="{381B9D29-08F8-4CE7-A193-010DEFB6053D}" sibTransId="{FB3B235A-AFDF-473B-8886-5E00CAEC9AF8}"/>
+    <dgm:cxn modelId="{1AB3FC43-842B-417B-855D-90D0647ED524}" srcId="{0A22175F-9E50-4726-A201-531B05BDD5B6}" destId="{E720B028-D74C-4248-8004-CA63C7B0E3CB}" srcOrd="0" destOrd="0" parTransId="{7D892449-47AD-40E4-8943-8FB7AD92C8A6}" sibTransId="{058B1AC4-673E-41D8-83E3-E3BD46E24871}"/>
+    <dgm:cxn modelId="{698C34F1-16CC-472A-9675-F721FE9B9E5E}" srcId="{0A22175F-9E50-4726-A201-531B05BDD5B6}" destId="{C1583B5F-B658-4636-A601-4357E8D5315D}" srcOrd="4" destOrd="0" parTransId="{4174C859-F47D-45B6-BD36-FF92AD4185F1}" sibTransId="{D64CB2E0-8133-4AF3-BE54-8943F8095AE9}"/>
+    <dgm:cxn modelId="{0208A5D3-848E-4EEE-92C1-143E217871E3}" type="presOf" srcId="{6DCFE96D-80DA-46BF-A725-6CFB410E9828}" destId="{CF124B02-E0ED-4DE1-8EC9-EC9D50CBB9B8}" srcOrd="0" destOrd="0" presId="urn:microsoft.com/office/officeart/2008/layout/VerticalCurvedList"/>
+    <dgm:cxn modelId="{16DDDD6E-3BBB-4F4E-AD80-0B5809C99847}" type="presOf" srcId="{0A22175F-9E50-4726-A201-531B05BDD5B6}" destId="{5C57B3EE-E7F9-49CE-835D-EF74F2DCB7CC}" srcOrd="0" destOrd="0" presId="urn:microsoft.com/office/officeart/2008/layout/VerticalCurvedList"/>
+    <dgm:cxn modelId="{E19FF7B7-B39D-4EFA-A773-9FD0C286B1A2}" type="presOf" srcId="{C1583B5F-B658-4636-A601-4357E8D5315D}" destId="{9F96E16C-BD40-4AF9-AFBC-9C01FC40DDC2}" srcOrd="0" destOrd="0" presId="urn:microsoft.com/office/officeart/2008/layout/VerticalCurvedList"/>
+    <dgm:cxn modelId="{3B08EA29-0DC5-4E1F-BF00-841FA67C853E}" type="presOf" srcId="{5E44BE74-7BDB-4CD1-85D7-157A768B6599}" destId="{F48BC0AB-2842-41B2-98EC-4C85F15D140C}" srcOrd="0" destOrd="0" presId="urn:microsoft.com/office/officeart/2008/layout/VerticalCurvedList"/>
+    <dgm:cxn modelId="{1AFC318B-91FD-41D8-88FA-F3B517EC0022}" srcId="{0A22175F-9E50-4726-A201-531B05BDD5B6}" destId="{3D9F95B1-9E41-4B89-A74A-18D8958B5368}" srcOrd="3" destOrd="0" parTransId="{45B5EB23-9E64-4A1C-A4BD-C676D38EB973}" sibTransId="{4E755FB8-62F4-4729-9A9B-50B431452079}"/>
     <dgm:cxn modelId="{FB10B419-1D3A-4EFF-9769-58363C8877E8}" type="presOf" srcId="{058B1AC4-673E-41D8-83E3-E3BD46E24871}" destId="{B710228F-41CA-41E4-A072-038F184BFE0A}" srcOrd="0" destOrd="0" presId="urn:microsoft.com/office/officeart/2008/layout/VerticalCurvedList"/>
-    <dgm:cxn modelId="{3B08EA29-0DC5-4E1F-BF00-841FA67C853E}" type="presOf" srcId="{5E44BE74-7BDB-4CD1-85D7-157A768B6599}" destId="{F48BC0AB-2842-41B2-98EC-4C85F15D140C}" srcOrd="0" destOrd="0" presId="urn:microsoft.com/office/officeart/2008/layout/VerticalCurvedList"/>
-    <dgm:cxn modelId="{11A4BB34-7391-466E-B258-C401B186171C}" type="presOf" srcId="{3D9F95B1-9E41-4B89-A74A-18D8958B5368}" destId="{23A5D521-006E-4CB2-BCA9-EC3BE9A1188B}" srcOrd="0" destOrd="0" presId="urn:microsoft.com/office/officeart/2008/layout/VerticalCurvedList"/>
-    <dgm:cxn modelId="{F9F4C943-FEA2-48AB-99D4-EE74BCB0BD8D}" type="presOf" srcId="{E720B028-D74C-4248-8004-CA63C7B0E3CB}" destId="{30D3C256-CFB7-480A-A966-7B86A386D68F}" srcOrd="0" destOrd="0" presId="urn:microsoft.com/office/officeart/2008/layout/VerticalCurvedList"/>
-    <dgm:cxn modelId="{1AB3FC43-842B-417B-855D-90D0647ED524}" srcId="{0A22175F-9E50-4726-A201-531B05BDD5B6}" destId="{E720B028-D74C-4248-8004-CA63C7B0E3CB}" srcOrd="0" destOrd="0" parTransId="{7D892449-47AD-40E4-8943-8FB7AD92C8A6}" sibTransId="{058B1AC4-673E-41D8-83E3-E3BD46E24871}"/>
-    <dgm:cxn modelId="{A259F24D-7109-408B-A0EE-7521ECE6C59F}" srcId="{0A22175F-9E50-4726-A201-531B05BDD5B6}" destId="{5E44BE74-7BDB-4CD1-85D7-157A768B6599}" srcOrd="2" destOrd="0" parTransId="{D5639A8C-0944-4765-A207-89A9F449FB58}" sibTransId="{95061DE8-40B6-492F-92B5-809BCDFD685D}"/>
-    <dgm:cxn modelId="{16DDDD6E-3BBB-4F4E-AD80-0B5809C99847}" type="presOf" srcId="{0A22175F-9E50-4726-A201-531B05BDD5B6}" destId="{5C57B3EE-E7F9-49CE-835D-EF74F2DCB7CC}" srcOrd="0" destOrd="0" presId="urn:microsoft.com/office/officeart/2008/layout/VerticalCurvedList"/>
-    <dgm:cxn modelId="{1AFC318B-91FD-41D8-88FA-F3B517EC0022}" srcId="{0A22175F-9E50-4726-A201-531B05BDD5B6}" destId="{3D9F95B1-9E41-4B89-A74A-18D8958B5368}" srcOrd="3" destOrd="0" parTransId="{45B5EB23-9E64-4A1C-A4BD-C676D38EB973}" sibTransId="{4E755FB8-62F4-4729-9A9B-50B431452079}"/>
-    <dgm:cxn modelId="{E19FF7B7-B39D-4EFA-A773-9FD0C286B1A2}" type="presOf" srcId="{C1583B5F-B658-4636-A601-4357E8D5315D}" destId="{9F96E16C-BD40-4AF9-AFBC-9C01FC40DDC2}" srcOrd="0" destOrd="0" presId="urn:microsoft.com/office/officeart/2008/layout/VerticalCurvedList"/>
-    <dgm:cxn modelId="{0208A5D3-848E-4EEE-92C1-143E217871E3}" type="presOf" srcId="{6DCFE96D-80DA-46BF-A725-6CFB410E9828}" destId="{CF124B02-E0ED-4DE1-8EC9-EC9D50CBB9B8}" srcOrd="0" destOrd="0" presId="urn:microsoft.com/office/officeart/2008/layout/VerticalCurvedList"/>
-    <dgm:cxn modelId="{23BCDEDB-812F-453B-8C62-1613B6288CD0}" srcId="{0A22175F-9E50-4726-A201-531B05BDD5B6}" destId="{6DCFE96D-80DA-46BF-A725-6CFB410E9828}" srcOrd="1" destOrd="0" parTransId="{381B9D29-08F8-4CE7-A193-010DEFB6053D}" sibTransId="{FB3B235A-AFDF-473B-8886-5E00CAEC9AF8}"/>
-    <dgm:cxn modelId="{698C34F1-16CC-472A-9675-F721FE9B9E5E}" srcId="{0A22175F-9E50-4726-A201-531B05BDD5B6}" destId="{C1583B5F-B658-4636-A601-4357E8D5315D}" srcOrd="4" destOrd="0" parTransId="{4174C859-F47D-45B6-BD36-FF92AD4185F1}" sibTransId="{D64CB2E0-8133-4AF3-BE54-8943F8095AE9}"/>
     <dgm:cxn modelId="{D19C3EB7-42AF-4D96-9FD8-9970F41E48E8}" type="presParOf" srcId="{5C57B3EE-E7F9-49CE-835D-EF74F2DCB7CC}" destId="{63005BE7-3469-43AD-8513-7909B56C13B4}" srcOrd="0" destOrd="0" presId="urn:microsoft.com/office/officeart/2008/layout/VerticalCurvedList"/>
     <dgm:cxn modelId="{B16599C9-6BC7-40D9-B470-3F001A147D6E}" type="presParOf" srcId="{63005BE7-3469-43AD-8513-7909B56C13B4}" destId="{A55325B9-F140-4749-B248-BDA4897718C3}" srcOrd="0" destOrd="0" presId="urn:microsoft.com/office/officeart/2008/layout/VerticalCurvedList"/>
     <dgm:cxn modelId="{A7743560-D2F3-4DD0-B5C8-D07CCE50C3D5}" type="presParOf" srcId="{A55325B9-F140-4749-B248-BDA4897718C3}" destId="{FF5FD416-8277-4821-B15C-39EFD75502F7}" srcOrd="0" destOrd="0" presId="urn:microsoft.com/office/officeart/2008/layout/VerticalCurvedList"/>
@@ -1747,7 +1796,7 @@
         </a:bodyPr>
         <a:lstStyle/>
         <a:p>
-          <a:pPr marL="0" lvl="0" indent="0" algn="just" defTabSz="711200">
+          <a:pPr lvl="0" algn="just" defTabSz="711200">
             <a:lnSpc>
               <a:spcPct val="90000"/>
             </a:lnSpc>
@@ -1757,7 +1806,6 @@
             <a:spcAft>
               <a:spcPts val="0"/>
             </a:spcAft>
-            <a:buNone/>
           </a:pPr>
           <a:r>
             <a:rPr lang="fr-FR" sz="1600" b="1" kern="1200" dirty="0">
@@ -1895,7 +1943,7 @@
         </a:bodyPr>
         <a:lstStyle/>
         <a:p>
-          <a:pPr marL="0" lvl="0" indent="0" algn="l" defTabSz="711200">
+          <a:pPr lvl="0" algn="l" defTabSz="711200">
             <a:lnSpc>
               <a:spcPct val="90000"/>
             </a:lnSpc>
@@ -1905,7 +1953,6 @@
             <a:spcAft>
               <a:spcPct val="35000"/>
             </a:spcAft>
-            <a:buNone/>
           </a:pPr>
           <a:r>
             <a:rPr lang="fr-FR" sz="1600" b="1" kern="1200" dirty="0">
@@ -2078,7 +2125,7 @@
         </a:bodyPr>
         <a:lstStyle/>
         <a:p>
-          <a:pPr marL="0" lvl="0" indent="0" algn="l" defTabSz="711200">
+          <a:pPr lvl="0" algn="l" defTabSz="711200">
             <a:lnSpc>
               <a:spcPct val="90000"/>
             </a:lnSpc>
@@ -2088,7 +2135,6 @@
             <a:spcAft>
               <a:spcPct val="35000"/>
             </a:spcAft>
-            <a:buNone/>
           </a:pPr>
           <a:r>
             <a:rPr lang="fr-FR" sz="1600" b="1" kern="1200" dirty="0">
@@ -2299,7 +2345,7 @@
         </a:bodyPr>
         <a:lstStyle/>
         <a:p>
-          <a:pPr marL="0" lvl="0" indent="0" algn="just" defTabSz="711200">
+          <a:pPr lvl="0" algn="just" defTabSz="711200">
             <a:lnSpc>
               <a:spcPct val="90000"/>
             </a:lnSpc>
@@ -2309,7 +2355,6 @@
             <a:spcAft>
               <a:spcPts val="0"/>
             </a:spcAft>
-            <a:buNone/>
           </a:pPr>
           <a:r>
             <a:rPr lang="fr-FR" sz="1600" b="1" kern="1200" dirty="0">
@@ -2499,7 +2544,7 @@
         </a:bodyPr>
         <a:lstStyle/>
         <a:p>
-          <a:pPr marL="0" lvl="0" indent="0" algn="just" defTabSz="711200">
+          <a:pPr lvl="0" algn="just" defTabSz="711200">
             <a:lnSpc>
               <a:spcPct val="90000"/>
             </a:lnSpc>
@@ -2509,7 +2554,6 @@
             <a:spcAft>
               <a:spcPts val="0"/>
             </a:spcAft>
-            <a:buNone/>
           </a:pPr>
           <a:r>
             <a:rPr lang="fr-FR" sz="1600" b="1" kern="1200" dirty="0">
@@ -5014,7 +5058,7 @@
                 <a:latin typeface="Arial" pitchFamily="34" charset="0"/>
               </a:rPr>
               <a:pPr/>
-              <a:t>12/11/2019</a:t>
+              <a:t>12/12/2019</a:t>
             </a:fld>
             <a:endParaRPr lang="en-US" dirty="0">
               <a:latin typeface="Arial" pitchFamily="34" charset="0"/>
@@ -5193,7 +5237,7 @@
             <a:fld id="{B5D7A87D-1CDA-443F-BAE3-82C9C05446C3}" type="datetimeFigureOut">
               <a:rPr lang="en-US" smtClean="0"/>
               <a:pPr/>
-              <a:t>12/11/2019</a:t>
+              <a:t>12/12/2019</a:t>
             </a:fld>
             <a:endParaRPr lang="en-US" dirty="0"/>
           </a:p>
@@ -29381,6 +29425,13 @@
   <p:transition>
     <p:fade/>
   </p:transition>
+  <p:timing>
+    <p:tnLst>
+      <p:par>
+        <p:cTn id="1" dur="indefinite" restart="never" nodeType="tmRoot"/>
+      </p:par>
+    </p:tnLst>
+  </p:timing>
 </p:sld>
 </file>
 
@@ -29584,6 +29635,13 @@
   <p:clrMapOvr>
     <a:masterClrMapping/>
   </p:clrMapOvr>
+  <p:timing>
+    <p:tnLst>
+      <p:par>
+        <p:cTn id="1" dur="indefinite" restart="never" nodeType="tmRoot"/>
+      </p:par>
+    </p:tnLst>
+  </p:timing>
 </p:sld>
 </file>
 
@@ -32194,6 +32252,13 @@
   <p:clrMapOvr>
     <a:masterClrMapping/>
   </p:clrMapOvr>
+  <p:timing>
+    <p:tnLst>
+      <p:par>
+        <p:cTn id="1" dur="indefinite" restart="never" nodeType="tmRoot"/>
+      </p:par>
+    </p:tnLst>
+  </p:timing>
 </p:sld>
 </file>
 
@@ -32307,6 +32372,13 @@
   <p:clrMapOvr>
     <a:masterClrMapping/>
   </p:clrMapOvr>
+  <p:timing>
+    <p:tnLst>
+      <p:par>
+        <p:cTn id="1" dur="indefinite" restart="never" nodeType="tmRoot"/>
+      </p:par>
+    </p:tnLst>
+  </p:timing>
 </p:sld>
 </file>
 
@@ -32462,6 +32534,13 @@
   <p:clrMapOvr>
     <a:masterClrMapping/>
   </p:clrMapOvr>
+  <p:timing>
+    <p:tnLst>
+      <p:par>
+        <p:cTn id="1" dur="indefinite" restart="never" nodeType="tmRoot"/>
+      </p:par>
+    </p:tnLst>
+  </p:timing>
 </p:sld>
 </file>
 
@@ -34207,6 +34286,13 @@
   <p:clrMapOvr>
     <a:masterClrMapping/>
   </p:clrMapOvr>
+  <p:timing>
+    <p:tnLst>
+      <p:par>
+        <p:cTn id="1" dur="indefinite" restart="never" nodeType="tmRoot"/>
+      </p:par>
+    </p:tnLst>
+  </p:timing>
 </p:sld>
 </file>
 
@@ -34869,9 +34955,7 @@
               <a:t>Opinionated </a:t>
             </a:r>
             <a:r>
-              <a:rPr lang="en-US" dirty="0">
-                <a:hlinkClick r:id="rId3"/>
-              </a:rPr>
+              <a:rPr lang="en-US" dirty="0"/>
               <a:t>starter</a:t>
             </a:r>
             <a:r>
@@ -35079,6 +35163,13 @@
   <p:clrMapOvr>
     <a:masterClrMapping/>
   </p:clrMapOvr>
+  <p:timing>
+    <p:tnLst>
+      <p:par>
+        <p:cTn id="1" dur="indefinite" restart="never" nodeType="tmRoot"/>
+      </p:par>
+    </p:tnLst>
+  </p:timing>
 </p:sld>
 </file>
 
@@ -35315,6 +35406,13 @@
   <p:clrMapOvr>
     <a:masterClrMapping/>
   </p:clrMapOvr>
+  <p:timing>
+    <p:tnLst>
+      <p:par>
+        <p:cTn id="1" dur="indefinite" restart="never" nodeType="tmRoot"/>
+      </p:par>
+    </p:tnLst>
+  </p:timing>
 </p:sld>
 </file>
 
@@ -35775,6 +35873,13 @@
   <p:clrMapOvr>
     <a:masterClrMapping/>
   </p:clrMapOvr>
+  <p:timing>
+    <p:tnLst>
+      <p:par>
+        <p:cTn id="1" dur="indefinite" restart="never" nodeType="tmRoot"/>
+      </p:par>
+    </p:tnLst>
+  </p:timing>
 </p:sld>
 </file>
 
@@ -36239,6 +36344,13 @@
   <p:clrMapOvr>
     <a:masterClrMapping/>
   </p:clrMapOvr>
+  <p:timing>
+    <p:tnLst>
+      <p:par>
+        <p:cTn id="1" dur="indefinite" restart="never" nodeType="tmRoot"/>
+      </p:par>
+    </p:tnLst>
+  </p:timing>
 </p:sld>
 </file>
 
@@ -37183,6 +37295,13 @@
   <p:clrMapOvr>
     <a:masterClrMapping/>
   </p:clrMapOvr>
+  <p:timing>
+    <p:tnLst>
+      <p:par>
+        <p:cTn id="1" dur="indefinite" restart="never" nodeType="tmRoot"/>
+      </p:par>
+    </p:tnLst>
+  </p:timing>
 </p:sld>
 </file>
 
@@ -37706,6 +37825,13 @@
   <p:clrMapOvr>
     <a:masterClrMapping/>
   </p:clrMapOvr>
+  <p:timing>
+    <p:tnLst>
+      <p:par>
+        <p:cTn id="1" dur="indefinite" restart="never" nodeType="tmRoot"/>
+      </p:par>
+    </p:tnLst>
+  </p:timing>
 </p:sld>
 </file>
 
@@ -37930,6 +38056,13 @@
   <p:clrMapOvr>
     <a:masterClrMapping/>
   </p:clrMapOvr>
+  <p:timing>
+    <p:tnLst>
+      <p:par>
+        <p:cTn id="1" dur="indefinite" restart="never" nodeType="tmRoot"/>
+      </p:par>
+    </p:tnLst>
+  </p:timing>
 </p:sld>
 </file>
 
@@ -38359,6 +38492,13 @@
   <p:clrMapOvr>
     <a:masterClrMapping/>
   </p:clrMapOvr>
+  <p:timing>
+    <p:tnLst>
+      <p:par>
+        <p:cTn id="1" dur="indefinite" restart="never" nodeType="tmRoot"/>
+      </p:par>
+    </p:tnLst>
+  </p:timing>
 </p:sld>
 </file>
 
@@ -38997,6 +39137,13 @@
   <p:clrMapOvr>
     <a:masterClrMapping/>
   </p:clrMapOvr>
+  <p:timing>
+    <p:tnLst>
+      <p:par>
+        <p:cTn id="1" dur="indefinite" restart="never" nodeType="tmRoot"/>
+      </p:par>
+    </p:tnLst>
+  </p:timing>
 </p:sld>
 </file>
 
@@ -40032,6 +40179,15 @@
 </file>
 
 <file path=customXml/item1.xml><?xml version="1.0" encoding="utf-8"?>
+<?mso-contentType ?>
+<FormTemplates xmlns="http://schemas.microsoft.com/sharepoint/v3/contenttype/forms">
+  <Display>DocumentLibraryForm</Display>
+  <Edit>DocumentLibraryForm</Edit>
+  <New>DocumentLibraryForm</New>
+</FormTemplates>
+</file>
+
+<file path=customXml/item2.xml><?xml version="1.0" encoding="utf-8"?>
 <p:properties xmlns:p="http://schemas.microsoft.com/office/2006/metadata/properties" xmlns:xsi="http://www.w3.org/2001/XMLSchema-instance">
   <documentManagement>
     <c5aebc35b3e840e5912c276ffe755dcf xmlns="d95a5b16-1b8d-4c7c-9ebf-89c0983b6970">
@@ -40112,152 +40268,7 @@
 </p:properties>
 </file>
 
-<file path=customXml/item2.xml><?xml version="1.0" encoding="utf-8"?>
-<?mso-contentType ?>
-<FormTemplates xmlns="http://schemas.microsoft.com/sharepoint/v3/contenttype/forms">
-  <Display>DocumentLibraryForm</Display>
-  <Edit>DocumentLibraryForm</Edit>
-  <New>DocumentLibraryForm</New>
-</FormTemplates>
-</file>
-
 <file path=customXml/item3.xml><?xml version="1.0" encoding="utf-8"?>
-<?mso-contentType ?>
-<spe:Receivers xmlns:spe="http://schemas.microsoft.com/sharepoint/events">
-  <Receiver>
-    <Name>ItemUpdatedEventHandlerForConceptSearch</Name>
-    <Synchronization>Default</Synchronization>
-    <Type>10002</Type>
-    <SequenceNumber>10001</SequenceNumber>
-    <Assembly>conceptSearching.Sharepoint.ContentTypes, Version=1.0.0.0, Culture=neutral, PublicKeyToken=858f8f13980e4745</Assembly>
-    <Class>conceptSearching.Sharepoint.ContentTypes.CSHandleEvent</Class>
-    <Data/>
-    <Filter/>
-  </Receiver>
-  <Receiver>
-    <Name>ItemCheckedInEventHandlerForConceptSearch</Name>
-    <Synchronization>Default</Synchronization>
-    <Type>10004</Type>
-    <SequenceNumber>10002</SequenceNumber>
-    <Assembly>conceptSearching.Sharepoint.ContentTypes, Version=1.0.0.0, Culture=neutral, PublicKeyToken=858f8f13980e4745</Assembly>
-    <Class>conceptSearching.Sharepoint.ContentTypes.CSHandleEvent</Class>
-    <Data/>
-    <Filter/>
-  </Receiver>
-  <Receiver>
-    <Name>ItemUncheckedOutEventHandlerForConceptSearch</Name>
-    <Synchronization>Default</Synchronization>
-    <Type>10006</Type>
-    <SequenceNumber>10003</SequenceNumber>
-    <Assembly>conceptSearching.Sharepoint.ContentTypes, Version=1.0.0.0, Culture=neutral, PublicKeyToken=858f8f13980e4745</Assembly>
-    <Class>conceptSearching.Sharepoint.ContentTypes.CSHandleEvent</Class>
-    <Data/>
-    <Filter/>
-  </Receiver>
-  <Receiver>
-    <Name>ItemAddedEventHandlerForConceptSearch</Name>
-    <Synchronization>Default</Synchronization>
-    <Type>10001</Type>
-    <SequenceNumber>10004</SequenceNumber>
-    <Assembly>conceptSearching.Sharepoint.ContentTypes, Version=1.0.0.0, Culture=neutral, PublicKeyToken=858f8f13980e4745</Assembly>
-    <Class>conceptSearching.Sharepoint.ContentTypes.CSHandleEvent</Class>
-    <Data/>
-    <Filter/>
-  </Receiver>
-  <Receiver>
-    <Name>ItemFileMovedEventHandlerForConceptSearch</Name>
-    <Synchronization>Default</Synchronization>
-    <Type>10009</Type>
-    <SequenceNumber>10005</SequenceNumber>
-    <Assembly>conceptSearching.Sharepoint.ContentTypes, Version=1.0.0.0, Culture=neutral, PublicKeyToken=858f8f13980e4745</Assembly>
-    <Class>conceptSearching.Sharepoint.ContentTypes.CSHandleEvent</Class>
-    <Data/>
-    <Filter/>
-  </Receiver>
-  <Receiver>
-    <Name>ItemDeletedEventHandlerForConceptSearch</Name>
-    <Synchronization>Default</Synchronization>
-    <Type>10003</Type>
-    <SequenceNumber>10006</SequenceNumber>
-    <Assembly>conceptSearching.Sharepoint.ContentTypes, Version=1.0.0.0, Culture=neutral, PublicKeyToken=858f8f13980e4745</Assembly>
-    <Class>conceptSearching.Sharepoint.ContentTypes.CSHandleEvent</Class>
-    <Data/>
-    <Filter/>
-  </Receiver>
-  <Receiver>
-    <Name>ItemUpdatedEventHandlerForConceptSearch</Name>
-    <Synchronization>Asynchronous</Synchronization>
-    <Type>10002</Type>
-    <SequenceNumber>10001</SequenceNumber>
-    <Assembly>conceptSearching.Sharepoint.ContentTypes2010, Version=1.0.0.0, Culture=neutral, PublicKeyToken=858f8f13980e4745</Assembly>
-    <Class>conceptSearching.Sharepoint.ContentTypes2010.CSHandleEvent</Class>
-    <Data/>
-    <Filter/>
-  </Receiver>
-  <Receiver>
-    <Name>ItemUpdatingEventHandlerForConceptSearch</Name>
-    <Synchronization>Synchronous</Synchronization>
-    <Type>2</Type>
-    <SequenceNumber>10001</SequenceNumber>
-    <Assembly>conceptSearching.Sharepoint.ContentTypes2010, Version=1.0.0.0, Culture=neutral, PublicKeyToken=858f8f13980e4745</Assembly>
-    <Class>conceptSearching.Sharepoint.ContentTypes2010.CSHandleEvent</Class>
-    <Data/>
-    <Filter/>
-  </Receiver>
-  <Receiver>
-    <Name>ItemCheckedInEventHandlerForConceptSearch</Name>
-    <Synchronization>Asynchronous</Synchronization>
-    <Type>10004</Type>
-    <SequenceNumber>10002</SequenceNumber>
-    <Assembly>conceptSearching.Sharepoint.ContentTypes2010, Version=1.0.0.0, Culture=neutral, PublicKeyToken=858f8f13980e4745</Assembly>
-    <Class>conceptSearching.Sharepoint.ContentTypes2010.CSHandleEvent</Class>
-    <Data/>
-    <Filter/>
-  </Receiver>
-  <Receiver>
-    <Name>ItemUncheckedOutEventHandlerForConceptSearch</Name>
-    <Synchronization>Asynchronous</Synchronization>
-    <Type>10006</Type>
-    <SequenceNumber>10003</SequenceNumber>
-    <Assembly>conceptSearching.Sharepoint.ContentTypes2010, Version=1.0.0.0, Culture=neutral, PublicKeyToken=858f8f13980e4745</Assembly>
-    <Class>conceptSearching.Sharepoint.ContentTypes2010.CSHandleEvent</Class>
-    <Data/>
-    <Filter/>
-  </Receiver>
-  <Receiver>
-    <Name>ItemAddedEventHandlerForConceptSearch</Name>
-    <Synchronization>Asynchronous</Synchronization>
-    <Type>10001</Type>
-    <SequenceNumber>10004</SequenceNumber>
-    <Assembly>conceptSearching.Sharepoint.ContentTypes2010, Version=1.0.0.0, Culture=neutral, PublicKeyToken=858f8f13980e4745</Assembly>
-    <Class>conceptSearching.Sharepoint.ContentTypes2010.CSHandleEvent</Class>
-    <Data/>
-    <Filter/>
-  </Receiver>
-  <Receiver>
-    <Name>ItemFileMovedEventHandlerForConceptSearch</Name>
-    <Synchronization>Asynchronous</Synchronization>
-    <Type>10009</Type>
-    <SequenceNumber>10005</SequenceNumber>
-    <Assembly>conceptSearching.Sharepoint.ContentTypes2010, Version=1.0.0.0, Culture=neutral, PublicKeyToken=858f8f13980e4745</Assembly>
-    <Class>conceptSearching.Sharepoint.ContentTypes2010.CSHandleEvent</Class>
-    <Data/>
-    <Filter/>
-  </Receiver>
-  <Receiver>
-    <Name>ItemDeletedEventHandlerForConceptSearch</Name>
-    <Synchronization>Asynchronous</Synchronization>
-    <Type>10003</Type>
-    <SequenceNumber>10006</SequenceNumber>
-    <Assembly>conceptSearching.Sharepoint.ContentTypes2010, Version=1.0.0.0, Culture=neutral, PublicKeyToken=858f8f13980e4745</Assembly>
-    <Class>conceptSearching.Sharepoint.ContentTypes2010.CSHandleEvent</Class>
-    <Data/>
-    <Filter/>
-  </Receiver>
-</spe:Receivers>
-</file>
-
-<file path=customXml/item4.xml><?xml version="1.0" encoding="utf-8"?>
 <ct:contentTypeSchema xmlns:ct="http://schemas.microsoft.com/office/2006/metadata/contentType" xmlns:ma="http://schemas.microsoft.com/office/2006/metadata/properties/metaAttributes" ct:_="" ma:_="" ma:contentTypeName="Business Support" ma:contentTypeID="0x010100DCE5D5DBCBA6844C95AAA11EB3A32719002FF8385B8572694FA7ACC1CC37F60277" ma:contentTypeVersion="85" ma:contentTypeDescription="" ma:contentTypeScope="" ma:versionID="2e185370c66e36c56dd232e65dd02ed3">
   <xsd:schema xmlns:xsd="http://www.w3.org/2001/XMLSchema" xmlns:xs="http://www.w3.org/2001/XMLSchema" xmlns:p="http://schemas.microsoft.com/office/2006/metadata/properties" xmlns:ns1="http://schemas.microsoft.com/sharepoint/v3" xmlns:ns2="d95a5b16-1b8d-4c7c-9ebf-89c0983b6970" targetNamespace="http://schemas.microsoft.com/office/2006/metadata/properties" ma:root="true" ma:fieldsID="83532d8de379e40041d3a9288ce2e015" ns1:_="" ns2:_="">
     <xsd:import namespace="http://schemas.microsoft.com/sharepoint/v3"/>
@@ -40705,7 +40716,151 @@
 </ct:contentTypeSchema>
 </file>
 
+<file path=customXml/item4.xml><?xml version="1.0" encoding="utf-8"?>
+<?mso-contentType ?>
+<spe:Receivers xmlns:spe="http://schemas.microsoft.com/sharepoint/events">
+  <Receiver>
+    <Name>ItemUpdatedEventHandlerForConceptSearch</Name>
+    <Synchronization>Default</Synchronization>
+    <Type>10002</Type>
+    <SequenceNumber>10001</SequenceNumber>
+    <Assembly>conceptSearching.Sharepoint.ContentTypes, Version=1.0.0.0, Culture=neutral, PublicKeyToken=858f8f13980e4745</Assembly>
+    <Class>conceptSearching.Sharepoint.ContentTypes.CSHandleEvent</Class>
+    <Data/>
+    <Filter/>
+  </Receiver>
+  <Receiver>
+    <Name>ItemCheckedInEventHandlerForConceptSearch</Name>
+    <Synchronization>Default</Synchronization>
+    <Type>10004</Type>
+    <SequenceNumber>10002</SequenceNumber>
+    <Assembly>conceptSearching.Sharepoint.ContentTypes, Version=1.0.0.0, Culture=neutral, PublicKeyToken=858f8f13980e4745</Assembly>
+    <Class>conceptSearching.Sharepoint.ContentTypes.CSHandleEvent</Class>
+    <Data/>
+    <Filter/>
+  </Receiver>
+  <Receiver>
+    <Name>ItemUncheckedOutEventHandlerForConceptSearch</Name>
+    <Synchronization>Default</Synchronization>
+    <Type>10006</Type>
+    <SequenceNumber>10003</SequenceNumber>
+    <Assembly>conceptSearching.Sharepoint.ContentTypes, Version=1.0.0.0, Culture=neutral, PublicKeyToken=858f8f13980e4745</Assembly>
+    <Class>conceptSearching.Sharepoint.ContentTypes.CSHandleEvent</Class>
+    <Data/>
+    <Filter/>
+  </Receiver>
+  <Receiver>
+    <Name>ItemAddedEventHandlerForConceptSearch</Name>
+    <Synchronization>Default</Synchronization>
+    <Type>10001</Type>
+    <SequenceNumber>10004</SequenceNumber>
+    <Assembly>conceptSearching.Sharepoint.ContentTypes, Version=1.0.0.0, Culture=neutral, PublicKeyToken=858f8f13980e4745</Assembly>
+    <Class>conceptSearching.Sharepoint.ContentTypes.CSHandleEvent</Class>
+    <Data/>
+    <Filter/>
+  </Receiver>
+  <Receiver>
+    <Name>ItemFileMovedEventHandlerForConceptSearch</Name>
+    <Synchronization>Default</Synchronization>
+    <Type>10009</Type>
+    <SequenceNumber>10005</SequenceNumber>
+    <Assembly>conceptSearching.Sharepoint.ContentTypes, Version=1.0.0.0, Culture=neutral, PublicKeyToken=858f8f13980e4745</Assembly>
+    <Class>conceptSearching.Sharepoint.ContentTypes.CSHandleEvent</Class>
+    <Data/>
+    <Filter/>
+  </Receiver>
+  <Receiver>
+    <Name>ItemDeletedEventHandlerForConceptSearch</Name>
+    <Synchronization>Default</Synchronization>
+    <Type>10003</Type>
+    <SequenceNumber>10006</SequenceNumber>
+    <Assembly>conceptSearching.Sharepoint.ContentTypes, Version=1.0.0.0, Culture=neutral, PublicKeyToken=858f8f13980e4745</Assembly>
+    <Class>conceptSearching.Sharepoint.ContentTypes.CSHandleEvent</Class>
+    <Data/>
+    <Filter/>
+  </Receiver>
+  <Receiver>
+    <Name>ItemUpdatedEventHandlerForConceptSearch</Name>
+    <Synchronization>Asynchronous</Synchronization>
+    <Type>10002</Type>
+    <SequenceNumber>10001</SequenceNumber>
+    <Assembly>conceptSearching.Sharepoint.ContentTypes2010, Version=1.0.0.0, Culture=neutral, PublicKeyToken=858f8f13980e4745</Assembly>
+    <Class>conceptSearching.Sharepoint.ContentTypes2010.CSHandleEvent</Class>
+    <Data/>
+    <Filter/>
+  </Receiver>
+  <Receiver>
+    <Name>ItemUpdatingEventHandlerForConceptSearch</Name>
+    <Synchronization>Synchronous</Synchronization>
+    <Type>2</Type>
+    <SequenceNumber>10001</SequenceNumber>
+    <Assembly>conceptSearching.Sharepoint.ContentTypes2010, Version=1.0.0.0, Culture=neutral, PublicKeyToken=858f8f13980e4745</Assembly>
+    <Class>conceptSearching.Sharepoint.ContentTypes2010.CSHandleEvent</Class>
+    <Data/>
+    <Filter/>
+  </Receiver>
+  <Receiver>
+    <Name>ItemCheckedInEventHandlerForConceptSearch</Name>
+    <Synchronization>Asynchronous</Synchronization>
+    <Type>10004</Type>
+    <SequenceNumber>10002</SequenceNumber>
+    <Assembly>conceptSearching.Sharepoint.ContentTypes2010, Version=1.0.0.0, Culture=neutral, PublicKeyToken=858f8f13980e4745</Assembly>
+    <Class>conceptSearching.Sharepoint.ContentTypes2010.CSHandleEvent</Class>
+    <Data/>
+    <Filter/>
+  </Receiver>
+  <Receiver>
+    <Name>ItemUncheckedOutEventHandlerForConceptSearch</Name>
+    <Synchronization>Asynchronous</Synchronization>
+    <Type>10006</Type>
+    <SequenceNumber>10003</SequenceNumber>
+    <Assembly>conceptSearching.Sharepoint.ContentTypes2010, Version=1.0.0.0, Culture=neutral, PublicKeyToken=858f8f13980e4745</Assembly>
+    <Class>conceptSearching.Sharepoint.ContentTypes2010.CSHandleEvent</Class>
+    <Data/>
+    <Filter/>
+  </Receiver>
+  <Receiver>
+    <Name>ItemAddedEventHandlerForConceptSearch</Name>
+    <Synchronization>Asynchronous</Synchronization>
+    <Type>10001</Type>
+    <SequenceNumber>10004</SequenceNumber>
+    <Assembly>conceptSearching.Sharepoint.ContentTypes2010, Version=1.0.0.0, Culture=neutral, PublicKeyToken=858f8f13980e4745</Assembly>
+    <Class>conceptSearching.Sharepoint.ContentTypes2010.CSHandleEvent</Class>
+    <Data/>
+    <Filter/>
+  </Receiver>
+  <Receiver>
+    <Name>ItemFileMovedEventHandlerForConceptSearch</Name>
+    <Synchronization>Asynchronous</Synchronization>
+    <Type>10009</Type>
+    <SequenceNumber>10005</SequenceNumber>
+    <Assembly>conceptSearching.Sharepoint.ContentTypes2010, Version=1.0.0.0, Culture=neutral, PublicKeyToken=858f8f13980e4745</Assembly>
+    <Class>conceptSearching.Sharepoint.ContentTypes2010.CSHandleEvent</Class>
+    <Data/>
+    <Filter/>
+  </Receiver>
+  <Receiver>
+    <Name>ItemDeletedEventHandlerForConceptSearch</Name>
+    <Synchronization>Asynchronous</Synchronization>
+    <Type>10003</Type>
+    <SequenceNumber>10006</SequenceNumber>
+    <Assembly>conceptSearching.Sharepoint.ContentTypes2010, Version=1.0.0.0, Culture=neutral, PublicKeyToken=858f8f13980e4745</Assembly>
+    <Class>conceptSearching.Sharepoint.ContentTypes2010.CSHandleEvent</Class>
+    <Data/>
+    <Filter/>
+  </Receiver>
+</spe:Receivers>
+</file>
+
 <file path=customXml/itemProps1.xml><?xml version="1.0" encoding="utf-8"?>
+<ds:datastoreItem xmlns:ds="http://schemas.openxmlformats.org/officeDocument/2006/customXml" ds:itemID="{ADA5D674-9920-4D2F-B065-BC24FD29F86D}">
+  <ds:schemaRefs>
+    <ds:schemaRef ds:uri="http://schemas.microsoft.com/sharepoint/v3/contenttype/forms"/>
+  </ds:schemaRefs>
+</ds:datastoreItem>
+</file>
+
+<file path=customXml/itemProps2.xml><?xml version="1.0" encoding="utf-8"?>
 <ds:datastoreItem xmlns:ds="http://schemas.openxmlformats.org/officeDocument/2006/customXml" ds:itemID="{2F4C4F6A-F6A5-45C8-BAAA-52FB70E387C7}">
   <ds:schemaRefs>
     <ds:schemaRef ds:uri="http://purl.org/dc/elements/1.1/"/>
@@ -40722,23 +40877,7 @@
 </ds:datastoreItem>
 </file>
 
-<file path=customXml/itemProps2.xml><?xml version="1.0" encoding="utf-8"?>
-<ds:datastoreItem xmlns:ds="http://schemas.openxmlformats.org/officeDocument/2006/customXml" ds:itemID="{ADA5D674-9920-4D2F-B065-BC24FD29F86D}">
-  <ds:schemaRefs>
-    <ds:schemaRef ds:uri="http://schemas.microsoft.com/sharepoint/v3/contenttype/forms"/>
-  </ds:schemaRefs>
-</ds:datastoreItem>
-</file>
-
 <file path=customXml/itemProps3.xml><?xml version="1.0" encoding="utf-8"?>
-<ds:datastoreItem xmlns:ds="http://schemas.openxmlformats.org/officeDocument/2006/customXml" ds:itemID="{B6223829-22B6-4242-8D82-2D6B02106581}">
-  <ds:schemaRefs>
-    <ds:schemaRef ds:uri="http://schemas.microsoft.com/sharepoint/events"/>
-  </ds:schemaRefs>
-</ds:datastoreItem>
-</file>
-
-<file path=customXml/itemProps4.xml><?xml version="1.0" encoding="utf-8"?>
 <ds:datastoreItem xmlns:ds="http://schemas.openxmlformats.org/officeDocument/2006/customXml" ds:itemID="{987FA55F-5903-479D-BDD5-BC336782B1C6}">
   <ds:schemaRefs>
     <ds:schemaRef ds:uri="http://schemas.microsoft.com/office/2006/metadata/contentType"/>
@@ -40755,4 +40894,12 @@
     <ds:schemaRef ds:uri="http://schemas.microsoft.com/internal/obd"/>
   </ds:schemaRefs>
 </ds:datastoreItem>
+</file>
+
+<file path=customXml/itemProps4.xml><?xml version="1.0" encoding="utf-8"?>
+<ds:datastoreItem xmlns:ds="http://schemas.openxmlformats.org/officeDocument/2006/customXml" ds:itemID="{B6223829-22B6-4242-8D82-2D6B02106581}">
+  <ds:schemaRefs>
+    <ds:schemaRef ds:uri="http://schemas.microsoft.com/sharepoint/events"/>
+  </ds:schemaRefs>
+</ds:datastoreItem>
 </file>
</xml_diff>